<commit_message>
updaing files from meeting
</commit_message>
<xml_diff>
--- a/Design/Comms Project Design.pptx
+++ b/Design/Comms Project Design.pptx
@@ -5,32 +5,30 @@
     <p:sldMasterId id="2147483659" r:id="rId1"/>
   </p:sldMasterIdLst>
   <p:notesMasterIdLst>
-    <p:notesMasterId r:id="rId8"/>
+    <p:notesMasterId r:id="rId6"/>
   </p:notesMasterIdLst>
   <p:sldIdLst>
     <p:sldId id="256" r:id="rId2"/>
-    <p:sldId id="257" r:id="rId3"/>
-    <p:sldId id="258" r:id="rId4"/>
-    <p:sldId id="259" r:id="rId5"/>
-    <p:sldId id="261" r:id="rId6"/>
-    <p:sldId id="260" r:id="rId7"/>
+    <p:sldId id="259" r:id="rId3"/>
+    <p:sldId id="261" r:id="rId4"/>
+    <p:sldId id="262" r:id="rId5"/>
   </p:sldIdLst>
   <p:sldSz cx="9144000" cy="5143500" type="screen16x9"/>
   <p:notesSz cx="6858000" cy="9144000"/>
   <p:embeddedFontLst>
     <p:embeddedFont>
       <p:font typeface="Lato" panose="020F0502020204030203" pitchFamily="34" charset="0"/>
-      <p:regular r:id="rId9"/>
-      <p:bold r:id="rId10"/>
-      <p:italic r:id="rId11"/>
-      <p:boldItalic r:id="rId12"/>
+      <p:regular r:id="rId7"/>
+      <p:bold r:id="rId8"/>
+      <p:italic r:id="rId9"/>
+      <p:boldItalic r:id="rId10"/>
     </p:embeddedFont>
     <p:embeddedFont>
-      <p:font typeface="Montserrat" panose="00000500000000000000" pitchFamily="2" charset="0"/>
-      <p:regular r:id="rId13"/>
-      <p:bold r:id="rId14"/>
-      <p:italic r:id="rId15"/>
-      <p:boldItalic r:id="rId16"/>
+      <p:font typeface="Montserrat" pitchFamily="2" charset="77"/>
+      <p:regular r:id="rId11"/>
+      <p:bold r:id="rId12"/>
+      <p:italic r:id="rId13"/>
+      <p:boldItalic r:id="rId14"/>
     </p:embeddedFont>
   </p:embeddedFontLst>
   <p:defaultTextStyle>
@@ -751,8 +749,8 @@
         </p:nvSpPr>
         <p:spPr>
           <a:xfrm>
-            <a:off x="381300" y="685800"/>
-            <a:ext cx="6096075" cy="3429000"/>
+            <a:off x="381000" y="685800"/>
+            <a:ext cx="6096000" cy="3429000"/>
           </a:xfrm>
           <a:custGeom>
             <a:avLst/>
@@ -827,214 +825,6 @@
 </file>
 
 <file path=ppt/notesSlides/notesSlide2.xml><?xml version="1.0" encoding="utf-8"?>
-<p:notes xmlns:a="http://schemas.openxmlformats.org/drawingml/2006/main" xmlns:r="http://schemas.openxmlformats.org/officeDocument/2006/relationships" xmlns:p="http://schemas.openxmlformats.org/presentationml/2006/main" showMasterSp="0" showMasterPhAnim="0">
-  <p:cSld>
-    <p:spTree>
-      <p:nvGrpSpPr>
-        <p:cNvPr id="1" name="Shape 136"/>
-        <p:cNvGrpSpPr/>
-        <p:nvPr/>
-      </p:nvGrpSpPr>
-      <p:grpSpPr>
-        <a:xfrm>
-          <a:off x="0" y="0"/>
-          <a:ext cx="0" cy="0"/>
-          <a:chOff x="0" y="0"/>
-          <a:chExt cx="0" cy="0"/>
-        </a:xfrm>
-      </p:grpSpPr>
-      <p:sp>
-        <p:nvSpPr>
-          <p:cNvPr id="137" name="Google Shape;137;g28674d4200c_0_125:notes"/>
-          <p:cNvSpPr>
-            <a:spLocks noGrp="1" noRot="1" noChangeAspect="1"/>
-          </p:cNvSpPr>
-          <p:nvPr>
-            <p:ph type="sldImg" idx="2"/>
-          </p:nvPr>
-        </p:nvSpPr>
-        <p:spPr>
-          <a:xfrm>
-            <a:off x="381300" y="685800"/>
-            <a:ext cx="6096000" cy="3429000"/>
-          </a:xfrm>
-          <a:custGeom>
-            <a:avLst/>
-            <a:gdLst/>
-            <a:ahLst/>
-            <a:cxnLst/>
-            <a:rect l="l" t="t" r="r" b="b"/>
-            <a:pathLst>
-              <a:path w="120000" h="120000" extrusionOk="0">
-                <a:moveTo>
-                  <a:pt x="0" y="0"/>
-                </a:moveTo>
-                <a:lnTo>
-                  <a:pt x="120000" y="0"/>
-                </a:lnTo>
-                <a:lnTo>
-                  <a:pt x="120000" y="120000"/>
-                </a:lnTo>
-                <a:lnTo>
-                  <a:pt x="0" y="120000"/>
-                </a:lnTo>
-                <a:close/>
-              </a:path>
-            </a:pathLst>
-          </a:custGeom>
-        </p:spPr>
-      </p:sp>
-      <p:sp>
-        <p:nvSpPr>
-          <p:cNvPr id="138" name="Google Shape;138;g28674d4200c_0_125:notes"/>
-          <p:cNvSpPr txBox="1">
-            <a:spLocks noGrp="1"/>
-          </p:cNvSpPr>
-          <p:nvPr>
-            <p:ph type="body" idx="1"/>
-          </p:nvPr>
-        </p:nvSpPr>
-        <p:spPr>
-          <a:xfrm>
-            <a:off x="685800" y="4343400"/>
-            <a:ext cx="5486400" cy="4114800"/>
-          </a:xfrm>
-          <a:prstGeom prst="rect">
-            <a:avLst/>
-          </a:prstGeom>
-        </p:spPr>
-        <p:txBody>
-          <a:bodyPr spcFirstLastPara="1" wrap="square" lIns="91425" tIns="91425" rIns="91425" bIns="91425" anchor="t" anchorCtr="0">
-            <a:noAutofit/>
-          </a:bodyPr>
-          <a:lstStyle/>
-          <a:p>
-            <a:pPr marL="0" lvl="0" indent="0" algn="l" rtl="0">
-              <a:spcBef>
-                <a:spcPts val="0"/>
-              </a:spcBef>
-              <a:spcAft>
-                <a:spcPts val="0"/>
-              </a:spcAft>
-              <a:buNone/>
-            </a:pPr>
-            <a:endParaRPr/>
-          </a:p>
-        </p:txBody>
-      </p:sp>
-    </p:spTree>
-  </p:cSld>
-  <p:clrMapOvr>
-    <a:masterClrMapping/>
-  </p:clrMapOvr>
-</p:notes>
-</file>
-
-<file path=ppt/notesSlides/notesSlide3.xml><?xml version="1.0" encoding="utf-8"?>
-<p:notes xmlns:a="http://schemas.openxmlformats.org/drawingml/2006/main" xmlns:r="http://schemas.openxmlformats.org/officeDocument/2006/relationships" xmlns:p="http://schemas.openxmlformats.org/presentationml/2006/main" showMasterSp="0" showMasterPhAnim="0">
-  <p:cSld>
-    <p:spTree>
-      <p:nvGrpSpPr>
-        <p:cNvPr id="1" name="Shape 142"/>
-        <p:cNvGrpSpPr/>
-        <p:nvPr/>
-      </p:nvGrpSpPr>
-      <p:grpSpPr>
-        <a:xfrm>
-          <a:off x="0" y="0"/>
-          <a:ext cx="0" cy="0"/>
-          <a:chOff x="0" y="0"/>
-          <a:chExt cx="0" cy="0"/>
-        </a:xfrm>
-      </p:grpSpPr>
-      <p:sp>
-        <p:nvSpPr>
-          <p:cNvPr id="143" name="Google Shape;143;g28674d4200c_0_130:notes"/>
-          <p:cNvSpPr>
-            <a:spLocks noGrp="1" noRot="1" noChangeAspect="1"/>
-          </p:cNvSpPr>
-          <p:nvPr>
-            <p:ph type="sldImg" idx="2"/>
-          </p:nvPr>
-        </p:nvSpPr>
-        <p:spPr>
-          <a:xfrm>
-            <a:off x="381300" y="685800"/>
-            <a:ext cx="6096000" cy="3429000"/>
-          </a:xfrm>
-          <a:custGeom>
-            <a:avLst/>
-            <a:gdLst/>
-            <a:ahLst/>
-            <a:cxnLst/>
-            <a:rect l="l" t="t" r="r" b="b"/>
-            <a:pathLst>
-              <a:path w="120000" h="120000" extrusionOk="0">
-                <a:moveTo>
-                  <a:pt x="0" y="0"/>
-                </a:moveTo>
-                <a:lnTo>
-                  <a:pt x="120000" y="0"/>
-                </a:lnTo>
-                <a:lnTo>
-                  <a:pt x="120000" y="120000"/>
-                </a:lnTo>
-                <a:lnTo>
-                  <a:pt x="0" y="120000"/>
-                </a:lnTo>
-                <a:close/>
-              </a:path>
-            </a:pathLst>
-          </a:custGeom>
-        </p:spPr>
-      </p:sp>
-      <p:sp>
-        <p:nvSpPr>
-          <p:cNvPr id="144" name="Google Shape;144;g28674d4200c_0_130:notes"/>
-          <p:cNvSpPr txBox="1">
-            <a:spLocks noGrp="1"/>
-          </p:cNvSpPr>
-          <p:nvPr>
-            <p:ph type="body" idx="1"/>
-          </p:nvPr>
-        </p:nvSpPr>
-        <p:spPr>
-          <a:xfrm>
-            <a:off x="685800" y="4343400"/>
-            <a:ext cx="5486400" cy="4114800"/>
-          </a:xfrm>
-          <a:prstGeom prst="rect">
-            <a:avLst/>
-          </a:prstGeom>
-        </p:spPr>
-        <p:txBody>
-          <a:bodyPr spcFirstLastPara="1" wrap="square" lIns="91425" tIns="91425" rIns="91425" bIns="91425" anchor="t" anchorCtr="0">
-            <a:noAutofit/>
-          </a:bodyPr>
-          <a:lstStyle/>
-          <a:p>
-            <a:pPr marL="0" lvl="0" indent="0" algn="l" rtl="0">
-              <a:spcBef>
-                <a:spcPts val="0"/>
-              </a:spcBef>
-              <a:spcAft>
-                <a:spcPts val="0"/>
-              </a:spcAft>
-              <a:buNone/>
-            </a:pPr>
-            <a:endParaRPr/>
-          </a:p>
-        </p:txBody>
-      </p:sp>
-    </p:spTree>
-  </p:cSld>
-  <p:clrMapOvr>
-    <a:masterClrMapping/>
-  </p:clrMapOvr>
-</p:notes>
-</file>
-
-<file path=ppt/notesSlides/notesSlide4.xml><?xml version="1.0" encoding="utf-8"?>
 <p:notes xmlns:a="http://schemas.openxmlformats.org/drawingml/2006/main" xmlns:r="http://schemas.openxmlformats.org/officeDocument/2006/relationships" xmlns:p="http://schemas.openxmlformats.org/presentationml/2006/main" showMasterSp="0" showMasterPhAnim="0">
   <p:cSld>
     <p:spTree>
@@ -1126,7 +916,7 @@
               </a:spcAft>
               <a:buNone/>
             </a:pPr>
-            <a:endParaRPr/>
+            <a:endParaRPr dirty="0"/>
           </a:p>
         </p:txBody>
       </p:sp>
@@ -1138,7 +928,7 @@
 </p:notes>
 </file>
 
-<file path=ppt/notesSlides/notesSlide5.xml><?xml version="1.0" encoding="utf-8"?>
+<file path=ppt/notesSlides/notesSlide3.xml><?xml version="1.0" encoding="utf-8"?>
 <p:notes xmlns:a="http://schemas.openxmlformats.org/drawingml/2006/main" xmlns:r="http://schemas.openxmlformats.org/officeDocument/2006/relationships" xmlns:p="http://schemas.openxmlformats.org/presentationml/2006/main" showMasterSp="0" showMasterPhAnim="0">
   <p:cSld>
     <p:spTree>
@@ -1242,12 +1032,12 @@
 </p:notes>
 </file>
 
-<file path=ppt/notesSlides/notesSlide6.xml><?xml version="1.0" encoding="utf-8"?>
+<file path=ppt/notesSlides/notesSlide4.xml><?xml version="1.0" encoding="utf-8"?>
 <p:notes xmlns:a="http://schemas.openxmlformats.org/drawingml/2006/main" xmlns:r="http://schemas.openxmlformats.org/officeDocument/2006/relationships" xmlns:p="http://schemas.openxmlformats.org/presentationml/2006/main" showMasterSp="0" showMasterPhAnim="0">
   <p:cSld>
     <p:spTree>
       <p:nvGrpSpPr>
-        <p:cNvPr id="1" name="Shape 154"/>
+        <p:cNvPr id="1" name="Shape 159"/>
         <p:cNvGrpSpPr/>
         <p:nvPr/>
       </p:nvGrpSpPr>
@@ -1261,7 +1051,7 @@
       </p:grpSpPr>
       <p:sp>
         <p:nvSpPr>
-          <p:cNvPr id="155" name="Google Shape;155;g286ee612a7b_2_0:notes"/>
+          <p:cNvPr id="160" name="Google Shape;160;g286ee612a7b_2_5:notes"/>
           <p:cNvSpPr>
             <a:spLocks noGrp="1" noRot="1" noChangeAspect="1"/>
           </p:cNvSpPr>
@@ -1271,7 +1061,7 @@
         </p:nvSpPr>
         <p:spPr>
           <a:xfrm>
-            <a:off x="381300" y="685800"/>
+            <a:off x="381000" y="685800"/>
             <a:ext cx="6096000" cy="3429000"/>
           </a:xfrm>
           <a:custGeom>
@@ -1302,7 +1092,7 @@
       </p:sp>
       <p:sp>
         <p:nvSpPr>
-          <p:cNvPr id="156" name="Google Shape;156;g286ee612a7b_2_0:notes"/>
+          <p:cNvPr id="161" name="Google Shape;161;g286ee612a7b_2_5:notes"/>
           <p:cNvSpPr txBox="1">
             <a:spLocks noGrp="1"/>
           </p:cNvSpPr>
@@ -1339,6 +1129,11 @@
         </p:txBody>
       </p:sp>
     </p:spTree>
+    <p:extLst>
+      <p:ext uri="{BB962C8B-B14F-4D97-AF65-F5344CB8AC3E}">
+        <p14:creationId xmlns:p14="http://schemas.microsoft.com/office/powerpoint/2010/main" val="2985540694"/>
+      </p:ext>
+    </p:extLst>
   </p:cSld>
   <p:clrMapOvr>
     <a:masterClrMapping/>
@@ -9471,10 +9266,10 @@
               <a:buNone/>
             </a:pPr>
             <a:r>
-              <a:rPr lang="en"/>
+              <a:rPr lang="en" dirty="0"/>
               <a:t>Comms Project</a:t>
             </a:r>
-            <a:endParaRPr/>
+            <a:endParaRPr dirty="0"/>
           </a:p>
           <a:p>
             <a:pPr marL="0" lvl="0" indent="0" algn="l" rtl="0">
@@ -9487,10 +9282,10 @@
               <a:buNone/>
             </a:pPr>
             <a:r>
-              <a:rPr lang="en"/>
+              <a:rPr lang="en" dirty="0" err="1"/>
               <a:t>CLack</a:t>
             </a:r>
-            <a:endParaRPr/>
+            <a:endParaRPr dirty="0"/>
           </a:p>
         </p:txBody>
       </p:sp>
@@ -9515,7 +9310,7 @@
         </p:spPr>
         <p:txBody>
           <a:bodyPr spcFirstLastPara="1" wrap="square" lIns="91425" tIns="91425" rIns="91425" bIns="91425" anchor="t" anchorCtr="0">
-            <a:normAutofit lnSpcReduction="20000"/>
+            <a:normAutofit fontScale="92500" lnSpcReduction="20000"/>
           </a:bodyPr>
           <a:lstStyle/>
           <a:p>
@@ -9545,361 +9340,6 @@
 </file>
 
 <file path=ppt/slides/slide2.xml><?xml version="1.0" encoding="utf-8"?>
-<p:sld xmlns:a="http://schemas.openxmlformats.org/drawingml/2006/main" xmlns:r="http://schemas.openxmlformats.org/officeDocument/2006/relationships" xmlns:p="http://schemas.openxmlformats.org/presentationml/2006/main">
-  <p:cSld>
-    <p:spTree>
-      <p:nvGrpSpPr>
-        <p:cNvPr id="1" name="Shape 139"/>
-        <p:cNvGrpSpPr/>
-        <p:nvPr/>
-      </p:nvGrpSpPr>
-      <p:grpSpPr>
-        <a:xfrm>
-          <a:off x="0" y="0"/>
-          <a:ext cx="0" cy="0"/>
-          <a:chOff x="0" y="0"/>
-          <a:chExt cx="0" cy="0"/>
-        </a:xfrm>
-      </p:grpSpPr>
-      <p:sp>
-        <p:nvSpPr>
-          <p:cNvPr id="140" name="Google Shape;140;p14"/>
-          <p:cNvSpPr txBox="1">
-            <a:spLocks noGrp="1"/>
-          </p:cNvSpPr>
-          <p:nvPr>
-            <p:ph type="title"/>
-          </p:nvPr>
-        </p:nvSpPr>
-        <p:spPr>
-          <a:xfrm>
-            <a:off x="1297500" y="393750"/>
-            <a:ext cx="7038900" cy="914100"/>
-          </a:xfrm>
-          <a:prstGeom prst="rect">
-            <a:avLst/>
-          </a:prstGeom>
-        </p:spPr>
-        <p:txBody>
-          <a:bodyPr spcFirstLastPara="1" wrap="square" lIns="91425" tIns="91425" rIns="91425" bIns="91425" anchor="t" anchorCtr="0">
-            <a:normAutofit/>
-          </a:bodyPr>
-          <a:lstStyle/>
-          <a:p>
-            <a:pPr marL="0" lvl="0" indent="0" algn="l" rtl="0">
-              <a:spcBef>
-                <a:spcPts val="0"/>
-              </a:spcBef>
-              <a:spcAft>
-                <a:spcPts val="0"/>
-              </a:spcAft>
-              <a:buNone/>
-            </a:pPr>
-            <a:r>
-              <a:rPr lang="en"/>
-              <a:t>Project Overview</a:t>
-            </a:r>
-            <a:endParaRPr/>
-          </a:p>
-        </p:txBody>
-      </p:sp>
-      <p:sp>
-        <p:nvSpPr>
-          <p:cNvPr id="141" name="Google Shape;141;p14"/>
-          <p:cNvSpPr txBox="1">
-            <a:spLocks noGrp="1"/>
-          </p:cNvSpPr>
-          <p:nvPr>
-            <p:ph type="body" idx="1"/>
-          </p:nvPr>
-        </p:nvSpPr>
-        <p:spPr>
-          <a:xfrm>
-            <a:off x="1297500" y="1567550"/>
-            <a:ext cx="7038900" cy="2911200"/>
-          </a:xfrm>
-          <a:prstGeom prst="rect">
-            <a:avLst/>
-          </a:prstGeom>
-        </p:spPr>
-        <p:txBody>
-          <a:bodyPr spcFirstLastPara="1" wrap="square" lIns="91425" tIns="91425" rIns="91425" bIns="91425" anchor="t" anchorCtr="0">
-            <a:normAutofit/>
-          </a:bodyPr>
-          <a:lstStyle/>
-          <a:p>
-            <a:pPr marL="0" lvl="0" indent="0" algn="l" rtl="0">
-              <a:spcBef>
-                <a:spcPts val="0"/>
-              </a:spcBef>
-              <a:spcAft>
-                <a:spcPts val="1200"/>
-              </a:spcAft>
-              <a:buNone/>
-            </a:pPr>
-            <a:r>
-              <a:rPr lang="en" sz="1600"/>
-              <a:t>The project was commissioned to us by a company that wanted to have the ability to create Chat Rooms. Each chat room will contain at least two people (either personal DMs or group messages). The project will be written in Java and will feature a GUI that will be utilized as well.</a:t>
-            </a:r>
-            <a:endParaRPr sz="1600"/>
-          </a:p>
-        </p:txBody>
-      </p:sp>
-    </p:spTree>
-  </p:cSld>
-  <p:clrMapOvr>
-    <a:masterClrMapping/>
-  </p:clrMapOvr>
-</p:sld>
-</file>
-
-<file path=ppt/slides/slide3.xml><?xml version="1.0" encoding="utf-8"?>
-<p:sld xmlns:a="http://schemas.openxmlformats.org/drawingml/2006/main" xmlns:r="http://schemas.openxmlformats.org/officeDocument/2006/relationships" xmlns:p="http://schemas.openxmlformats.org/presentationml/2006/main">
-  <p:cSld>
-    <p:spTree>
-      <p:nvGrpSpPr>
-        <p:cNvPr id="1" name="Shape 145"/>
-        <p:cNvGrpSpPr/>
-        <p:nvPr/>
-      </p:nvGrpSpPr>
-      <p:grpSpPr>
-        <a:xfrm>
-          <a:off x="0" y="0"/>
-          <a:ext cx="0" cy="0"/>
-          <a:chOff x="0" y="0"/>
-          <a:chExt cx="0" cy="0"/>
-        </a:xfrm>
-      </p:grpSpPr>
-      <p:sp>
-        <p:nvSpPr>
-          <p:cNvPr id="146" name="Google Shape;146;p15"/>
-          <p:cNvSpPr txBox="1">
-            <a:spLocks noGrp="1"/>
-          </p:cNvSpPr>
-          <p:nvPr>
-            <p:ph type="title"/>
-          </p:nvPr>
-        </p:nvSpPr>
-        <p:spPr>
-          <a:xfrm>
-            <a:off x="1297500" y="393750"/>
-            <a:ext cx="7038900" cy="914100"/>
-          </a:xfrm>
-          <a:prstGeom prst="rect">
-            <a:avLst/>
-          </a:prstGeom>
-        </p:spPr>
-        <p:txBody>
-          <a:bodyPr spcFirstLastPara="1" wrap="square" lIns="91425" tIns="91425" rIns="91425" bIns="91425" anchor="t" anchorCtr="0">
-            <a:normAutofit/>
-          </a:bodyPr>
-          <a:lstStyle/>
-          <a:p>
-            <a:pPr marL="0" lvl="0" indent="0" algn="l" rtl="0">
-              <a:spcBef>
-                <a:spcPts val="0"/>
-              </a:spcBef>
-              <a:spcAft>
-                <a:spcPts val="0"/>
-              </a:spcAft>
-              <a:buNone/>
-            </a:pPr>
-            <a:r>
-              <a:rPr lang="en"/>
-              <a:t>Top Requirements</a:t>
-            </a:r>
-            <a:endParaRPr/>
-          </a:p>
-        </p:txBody>
-      </p:sp>
-      <p:sp>
-        <p:nvSpPr>
-          <p:cNvPr id="147" name="Google Shape;147;p15"/>
-          <p:cNvSpPr txBox="1">
-            <a:spLocks noGrp="1"/>
-          </p:cNvSpPr>
-          <p:nvPr>
-            <p:ph type="body" idx="1"/>
-          </p:nvPr>
-        </p:nvSpPr>
-        <p:spPr>
-          <a:xfrm>
-            <a:off x="1297500" y="1567550"/>
-            <a:ext cx="7038900" cy="2911200"/>
-          </a:xfrm>
-          <a:prstGeom prst="rect">
-            <a:avLst/>
-          </a:prstGeom>
-        </p:spPr>
-        <p:txBody>
-          <a:bodyPr spcFirstLastPara="1" wrap="square" lIns="91425" tIns="91425" rIns="91425" bIns="91425" anchor="t" anchorCtr="0">
-            <a:normAutofit/>
-          </a:bodyPr>
-          <a:lstStyle/>
-          <a:p>
-            <a:pPr marL="457200" lvl="0" indent="-311150" algn="l" rtl="0">
-              <a:spcBef>
-                <a:spcPts val="0"/>
-              </a:spcBef>
-              <a:spcAft>
-                <a:spcPts val="0"/>
-              </a:spcAft>
-              <a:buSzPts val="1300"/>
-              <a:buAutoNum type="arabicPeriod"/>
-            </a:pPr>
-            <a:r>
-              <a:rPr lang="en"/>
-              <a:t>Users must be able to send and receive messages from other users</a:t>
-            </a:r>
-            <a:endParaRPr/>
-          </a:p>
-          <a:p>
-            <a:pPr marL="457200" lvl="0" indent="-311150" algn="l" rtl="0">
-              <a:spcBef>
-                <a:spcPts val="0"/>
-              </a:spcBef>
-              <a:spcAft>
-                <a:spcPts val="0"/>
-              </a:spcAft>
-              <a:buSzPts val="1300"/>
-              <a:buAutoNum type="arabicPeriod"/>
-            </a:pPr>
-            <a:r>
-              <a:rPr lang="en"/>
-              <a:t>Users should login with their password and username. </a:t>
-            </a:r>
-            <a:endParaRPr/>
-          </a:p>
-          <a:p>
-            <a:pPr marL="457200" lvl="0" indent="-311150" algn="l" rtl="0">
-              <a:spcBef>
-                <a:spcPts val="0"/>
-              </a:spcBef>
-              <a:spcAft>
-                <a:spcPts val="0"/>
-              </a:spcAft>
-              <a:buSzPts val="1300"/>
-              <a:buAutoNum type="arabicPeriod"/>
-            </a:pPr>
-            <a:r>
-              <a:rPr lang="en"/>
-              <a:t>The server should be able to handle multiple clients at a given time.</a:t>
-            </a:r>
-            <a:endParaRPr/>
-          </a:p>
-          <a:p>
-            <a:pPr marL="457200" lvl="0" indent="-311150" algn="l" rtl="0">
-              <a:spcBef>
-                <a:spcPts val="0"/>
-              </a:spcBef>
-              <a:spcAft>
-                <a:spcPts val="0"/>
-              </a:spcAft>
-              <a:buSzPts val="1300"/>
-              <a:buAutoNum type="arabicPeriod"/>
-            </a:pPr>
-            <a:r>
-              <a:rPr lang="en"/>
-              <a:t>Each chat room data must be stored in individual log files.</a:t>
-            </a:r>
-            <a:endParaRPr/>
-          </a:p>
-          <a:p>
-            <a:pPr marL="457200" lvl="0" indent="-311150" algn="l" rtl="0">
-              <a:spcBef>
-                <a:spcPts val="0"/>
-              </a:spcBef>
-              <a:spcAft>
-                <a:spcPts val="0"/>
-              </a:spcAft>
-              <a:buSzPts val="1300"/>
-              <a:buAutoNum type="arabicPeriod"/>
-            </a:pPr>
-            <a:r>
-              <a:rPr lang="en"/>
-              <a:t>The GUI formats the messages in a readable and time ordered manner.</a:t>
-            </a:r>
-            <a:endParaRPr/>
-          </a:p>
-          <a:p>
-            <a:pPr marL="457200" lvl="0" indent="-311150" algn="l" rtl="0">
-              <a:spcBef>
-                <a:spcPts val="0"/>
-              </a:spcBef>
-              <a:spcAft>
-                <a:spcPts val="0"/>
-              </a:spcAft>
-              <a:buSzPts val="1300"/>
-              <a:buAutoNum type="arabicPeriod"/>
-            </a:pPr>
-            <a:r>
-              <a:rPr lang="en"/>
-              <a:t>A directory is available for Users to see who they sent messages to</a:t>
-            </a:r>
-            <a:endParaRPr/>
-          </a:p>
-          <a:p>
-            <a:pPr marL="457200" lvl="0" indent="-311150" algn="l" rtl="0">
-              <a:spcBef>
-                <a:spcPts val="0"/>
-              </a:spcBef>
-              <a:spcAft>
-                <a:spcPts val="0"/>
-              </a:spcAft>
-              <a:buSzPts val="1300"/>
-              <a:buAutoNum type="arabicPeriod"/>
-            </a:pPr>
-            <a:r>
-              <a:rPr lang="en"/>
-              <a:t>IT members must be able to view all messages inside the logs.</a:t>
-            </a:r>
-            <a:endParaRPr/>
-          </a:p>
-          <a:p>
-            <a:pPr marL="457200" lvl="0" indent="-311150" algn="l" rtl="0">
-              <a:spcBef>
-                <a:spcPts val="0"/>
-              </a:spcBef>
-              <a:spcAft>
-                <a:spcPts val="0"/>
-              </a:spcAft>
-              <a:buSzPts val="1300"/>
-              <a:buAutoNum type="arabicPeriod"/>
-            </a:pPr>
-            <a:r>
-              <a:rPr lang="en"/>
-              <a:t>A User must be part of the ChatRoom if they want to send a message inside that ChatRoom.</a:t>
-            </a:r>
-            <a:endParaRPr/>
-          </a:p>
-          <a:p>
-            <a:pPr marL="457200" lvl="0" indent="-311150" algn="l" rtl="0">
-              <a:spcBef>
-                <a:spcPts val="0"/>
-              </a:spcBef>
-              <a:spcAft>
-                <a:spcPts val="0"/>
-              </a:spcAft>
-              <a:buSzPts val="1300"/>
-              <a:buAutoNum type="arabicPeriod"/>
-            </a:pPr>
-            <a:r>
-              <a:rPr lang="en"/>
-              <a:t>The application must be written in Java and must use TCP/IP networking.</a:t>
-            </a:r>
-            <a:endParaRPr/>
-          </a:p>
-        </p:txBody>
-      </p:sp>
-    </p:spTree>
-  </p:cSld>
-  <p:clrMapOvr>
-    <a:masterClrMapping/>
-  </p:clrMapOvr>
-</p:sld>
-</file>
-
-<file path=ppt/slides/slide4.xml><?xml version="1.0" encoding="utf-8"?>
 <p:sld xmlns:a="http://schemas.openxmlformats.org/drawingml/2006/main" xmlns:r="http://schemas.openxmlformats.org/officeDocument/2006/relationships" xmlns:p="http://schemas.openxmlformats.org/presentationml/2006/main">
   <p:cSld>
     <p:spTree>
@@ -9951,10 +9391,10 @@
               <a:buNone/>
             </a:pPr>
             <a:r>
-              <a:rPr lang="en"/>
-              <a:t>Class Candidates</a:t>
+              <a:rPr lang="en-US" dirty="0"/>
+              <a:t>Agenda </a:t>
             </a:r>
-            <a:endParaRPr/>
+            <a:endParaRPr dirty="0"/>
           </a:p>
         </p:txBody>
       </p:sp>
@@ -9970,8 +9410,8 @@
         </p:nvSpPr>
         <p:spPr>
           <a:xfrm>
-            <a:off x="1297500" y="1116150"/>
-            <a:ext cx="7038900" cy="2911200"/>
+            <a:off x="1297499" y="1116150"/>
+            <a:ext cx="6367557" cy="2911200"/>
           </a:xfrm>
           <a:prstGeom prst="rect">
             <a:avLst/>
@@ -9993,11 +9433,7 @@
               <a:buSzPts val="1300"/>
               <a:buAutoNum type="arabicPeriod"/>
             </a:pPr>
-            <a:r>
-              <a:rPr lang="en" dirty="0"/>
-              <a:t>User</a:t>
-            </a:r>
-            <a:endParaRPr dirty="0"/>
+            <a:endParaRPr lang="en-US" dirty="0"/>
           </a:p>
           <a:p>
             <a:pPr marL="457200" lvl="0" indent="-311150" algn="l" rtl="0">
@@ -10011,10 +9447,9 @@
               <a:buAutoNum type="arabicPeriod"/>
             </a:pPr>
             <a:r>
-              <a:rPr lang="en" dirty="0"/>
-              <a:t>Chat Room</a:t>
+              <a:rPr lang="en-US" dirty="0"/>
+              <a:t>Refresher of Our Use Case </a:t>
             </a:r>
-            <a:endParaRPr dirty="0"/>
           </a:p>
           <a:p>
             <a:pPr marL="457200" lvl="0" indent="-311150" algn="l" rtl="0">
@@ -10028,27 +9463,63 @@
               <a:buAutoNum type="arabicPeriod"/>
             </a:pPr>
             <a:r>
-              <a:rPr lang="en" dirty="0"/>
-              <a:t>Message</a:t>
+              <a:rPr lang="en-US" dirty="0"/>
+              <a:t>GUI Class/Client Layout	</a:t>
             </a:r>
-            <a:endParaRPr dirty="0"/>
           </a:p>
           <a:p>
-            <a:pPr marL="457200" lvl="0" indent="-311150" algn="l" rtl="0">
-              <a:spcBef>
-                <a:spcPts val="0"/>
-              </a:spcBef>
-              <a:spcAft>
-                <a:spcPts val="0"/>
-              </a:spcAft>
+            <a:pPr lvl="1" indent="-311150">
               <a:buSzPts val="1300"/>
               <a:buAutoNum type="arabicPeriod"/>
             </a:pPr>
             <a:r>
-              <a:rPr lang="en" dirty="0"/>
-              <a:t>Chat History</a:t>
+              <a:rPr lang="en-US" dirty="0"/>
+              <a:t>Show GUI Layout</a:t>
             </a:r>
-            <a:endParaRPr dirty="0"/>
+          </a:p>
+          <a:p>
+            <a:pPr lvl="1" indent="-311150">
+              <a:buSzPts val="1300"/>
+              <a:buFont typeface="Lato"/>
+              <a:buAutoNum type="arabicPeriod"/>
+            </a:pPr>
+            <a:r>
+              <a:rPr lang="en-US" dirty="0"/>
+              <a:t>Show </a:t>
+            </a:r>
+            <a:r>
+              <a:rPr lang="en-US"/>
+              <a:t>Class Diagram</a:t>
+            </a:r>
+            <a:endParaRPr lang="en-US" dirty="0"/>
+          </a:p>
+          <a:p>
+            <a:pPr>
+              <a:buAutoNum type="arabicPeriod"/>
+            </a:pPr>
+            <a:r>
+              <a:rPr lang="en-US" dirty="0"/>
+              <a:t>Server Class / Server Handler Class</a:t>
+            </a:r>
+          </a:p>
+          <a:p>
+            <a:pPr lvl="1">
+              <a:buAutoNum type="arabicPeriod"/>
+            </a:pPr>
+            <a:r>
+              <a:rPr lang="en-US" dirty="0"/>
+              <a:t>Sequence diagram of server creating a Handler </a:t>
+            </a:r>
+          </a:p>
+          <a:p>
+            <a:pPr lvl="1">
+              <a:buFont typeface="Lato"/>
+              <a:buAutoNum type="arabicPeriod"/>
+            </a:pPr>
+            <a:r>
+              <a:rPr lang="en-US" dirty="0"/>
+              <a:t>Three Types of objects can be sent – Bool and MSG and User and String </a:t>
+            </a:r>
           </a:p>
           <a:p>
             <a:pPr marL="457200" lvl="0" indent="-311150" algn="l" rtl="0">
@@ -10062,9 +9533,59 @@
               <a:buAutoNum type="arabicPeriod"/>
             </a:pPr>
             <a:r>
-              <a:rPr lang="en" dirty="0"/>
-              <a:t>Client</a:t>
+              <a:rPr lang="en-US" dirty="0"/>
+              <a:t>Logging (What happens on Server </a:t>
             </a:r>
+            <a:r>
+              <a:rPr lang="en-US" dirty="0" err="1"/>
+              <a:t>ChatHistory</a:t>
+            </a:r>
+            <a:r>
+              <a:rPr lang="en-US" dirty="0"/>
+              <a:t> vs Client </a:t>
+            </a:r>
+            <a:r>
+              <a:rPr lang="en-US" dirty="0" err="1"/>
+              <a:t>ChatHistory</a:t>
+            </a:r>
+            <a:r>
+              <a:rPr lang="en-US" dirty="0"/>
+              <a:t>)</a:t>
+            </a:r>
+          </a:p>
+          <a:p>
+            <a:pPr lvl="1">
+              <a:buAutoNum type="arabicPeriod"/>
+            </a:pPr>
+            <a:r>
+              <a:rPr lang="en-US" dirty="0"/>
+              <a:t>Sequence diagram of the steps to logging on each side</a:t>
+            </a:r>
+          </a:p>
+          <a:p>
+            <a:pPr marL="457200" lvl="0" indent="-311150" algn="l" rtl="0">
+              <a:spcBef>
+                <a:spcPts val="0"/>
+              </a:spcBef>
+              <a:spcAft>
+                <a:spcPts val="0"/>
+              </a:spcAft>
+              <a:buSzPts val="1300"/>
+              <a:buAutoNum type="arabicPeriod"/>
+            </a:pPr>
+            <a:endParaRPr lang="en-US" dirty="0"/>
+          </a:p>
+          <a:p>
+            <a:pPr marL="457200" lvl="0" indent="-311150" algn="l" rtl="0">
+              <a:spcBef>
+                <a:spcPts val="0"/>
+              </a:spcBef>
+              <a:spcAft>
+                <a:spcPts val="0"/>
+              </a:spcAft>
+              <a:buSzPts val="1300"/>
+              <a:buAutoNum type="arabicPeriod"/>
+            </a:pPr>
             <a:endParaRPr dirty="0"/>
           </a:p>
         </p:txBody>
@@ -10077,7 +9598,7 @@
 </p:sld>
 </file>
 
-<file path=ppt/slides/slide5.xml><?xml version="1.0" encoding="utf-8"?>
+<file path=ppt/slides/slide3.xml><?xml version="1.0" encoding="utf-8"?>
 <p:sld xmlns:a="http://schemas.openxmlformats.org/drawingml/2006/main" xmlns:r="http://schemas.openxmlformats.org/officeDocument/2006/relationships" xmlns:p="http://schemas.openxmlformats.org/presentationml/2006/main">
   <p:cSld>
     <p:spTree>
@@ -10094,34 +9615,61 @@
           <a:chExt cx="0" cy="0"/>
         </a:xfrm>
       </p:grpSpPr>
-      <p:pic>
-        <p:nvPicPr>
-          <p:cNvPr id="163" name="Google Shape;163;p18"/>
-          <p:cNvPicPr preferRelativeResize="0"/>
-          <p:nvPr/>
-        </p:nvPicPr>
-        <p:blipFill>
-          <a:blip r:embed="rId3">
-            <a:alphaModFix/>
-          </a:blip>
-          <a:stretch>
-            <a:fillRect/>
-          </a:stretch>
-        </p:blipFill>
+      <p:sp>
+        <p:nvSpPr>
+          <p:cNvPr id="3" name="Google Shape;152;p16">
+            <a:extLst>
+              <a:ext uri="{FF2B5EF4-FFF2-40B4-BE49-F238E27FC236}">
+                <a16:creationId xmlns:a16="http://schemas.microsoft.com/office/drawing/2014/main" id="{F48FE553-F3F9-D234-FBF7-B5F1930ACE0B}"/>
+              </a:ext>
+            </a:extLst>
+          </p:cNvPr>
+          <p:cNvSpPr txBox="1">
+            <a:spLocks noGrp="1"/>
+          </p:cNvSpPr>
+          <p:nvPr>
+            <p:ph type="title"/>
+          </p:nvPr>
+        </p:nvSpPr>
         <p:spPr>
           <a:xfrm>
-            <a:off x="1804311" y="267750"/>
-            <a:ext cx="5535374" cy="4608000"/>
+            <a:off x="1297500" y="393750"/>
+            <a:ext cx="7038900" cy="914100"/>
           </a:xfrm>
           <a:prstGeom prst="rect">
             <a:avLst/>
           </a:prstGeom>
-          <a:noFill/>
-          <a:ln>
-            <a:noFill/>
-          </a:ln>
         </p:spPr>
-      </p:pic>
+        <p:txBody>
+          <a:bodyPr spcFirstLastPara="1" wrap="square" lIns="91425" tIns="91425" rIns="91425" bIns="91425" anchor="t" anchorCtr="0">
+            <a:normAutofit fontScale="90000"/>
+          </a:bodyPr>
+          <a:lstStyle/>
+          <a:p>
+            <a:pPr marL="0" lvl="0" indent="0" algn="l" rtl="0">
+              <a:spcBef>
+                <a:spcPts val="0"/>
+              </a:spcBef>
+              <a:spcAft>
+                <a:spcPts val="0"/>
+              </a:spcAft>
+              <a:buNone/>
+            </a:pPr>
+            <a:r>
+              <a:rPr lang="en" dirty="0"/>
+              <a:t>Class Diagram HERE</a:t>
+            </a:r>
+            <a:br>
+              <a:rPr lang="en" dirty="0"/>
+            </a:br>
+            <a:r>
+              <a:rPr lang="en" dirty="0"/>
+              <a:t>Talk about the Method</a:t>
+            </a:r>
+            <a:endParaRPr dirty="0"/>
+          </a:p>
+        </p:txBody>
+      </p:sp>
     </p:spTree>
   </p:cSld>
   <p:clrMapOvr>
@@ -10130,12 +9678,12 @@
 </p:sld>
 </file>
 
-<file path=ppt/slides/slide6.xml><?xml version="1.0" encoding="utf-8"?>
+<file path=ppt/slides/slide4.xml><?xml version="1.0" encoding="utf-8"?>
 <p:sld xmlns:a="http://schemas.openxmlformats.org/drawingml/2006/main" xmlns:r="http://schemas.openxmlformats.org/officeDocument/2006/relationships" xmlns:p="http://schemas.openxmlformats.org/presentationml/2006/main">
   <p:cSld>
     <p:spTree>
       <p:nvGrpSpPr>
-        <p:cNvPr id="1" name="Shape 157"/>
+        <p:cNvPr id="1" name="Shape 162"/>
         <p:cNvGrpSpPr/>
         <p:nvPr/>
       </p:nvGrpSpPr>
@@ -10147,35 +9695,60 @@
           <a:chExt cx="0" cy="0"/>
         </a:xfrm>
       </p:grpSpPr>
-      <p:pic>
-        <p:nvPicPr>
-          <p:cNvPr id="158" name="Google Shape;158;p17"/>
-          <p:cNvPicPr preferRelativeResize="0"/>
-          <p:nvPr/>
-        </p:nvPicPr>
-        <p:blipFill>
-          <a:blip r:embed="rId3">
-            <a:alphaModFix/>
-          </a:blip>
-          <a:stretch>
-            <a:fillRect/>
-          </a:stretch>
-        </p:blipFill>
+      <p:sp>
+        <p:nvSpPr>
+          <p:cNvPr id="3" name="Google Shape;152;p16">
+            <a:extLst>
+              <a:ext uri="{FF2B5EF4-FFF2-40B4-BE49-F238E27FC236}">
+                <a16:creationId xmlns:a16="http://schemas.microsoft.com/office/drawing/2014/main" id="{F48FE553-F3F9-D234-FBF7-B5F1930ACE0B}"/>
+              </a:ext>
+            </a:extLst>
+          </p:cNvPr>
+          <p:cNvSpPr txBox="1">
+            <a:spLocks noGrp="1"/>
+          </p:cNvSpPr>
+          <p:nvPr>
+            <p:ph type="title"/>
+          </p:nvPr>
+        </p:nvSpPr>
         <p:spPr>
           <a:xfrm>
-            <a:off x="1135763" y="478012"/>
-            <a:ext cx="6872474" cy="4187475"/>
+            <a:off x="1297500" y="393750"/>
+            <a:ext cx="7038900" cy="914100"/>
           </a:xfrm>
           <a:prstGeom prst="rect">
             <a:avLst/>
           </a:prstGeom>
-          <a:noFill/>
-          <a:ln>
-            <a:noFill/>
-          </a:ln>
         </p:spPr>
-      </p:pic>
+        <p:txBody>
+          <a:bodyPr spcFirstLastPara="1" wrap="square" lIns="91425" tIns="91425" rIns="91425" bIns="91425" anchor="t" anchorCtr="0">
+            <a:normAutofit/>
+          </a:bodyPr>
+          <a:lstStyle/>
+          <a:p>
+            <a:pPr marL="0" lvl="0" indent="0" algn="l" rtl="0">
+              <a:spcBef>
+                <a:spcPts val="0"/>
+              </a:spcBef>
+              <a:spcAft>
+                <a:spcPts val="0"/>
+              </a:spcAft>
+              <a:buNone/>
+            </a:pPr>
+            <a:r>
+              <a:rPr lang="en-US" dirty="0"/>
+              <a:t>GUI Diagram HERE</a:t>
+            </a:r>
+            <a:endParaRPr dirty="0"/>
+          </a:p>
+        </p:txBody>
+      </p:sp>
     </p:spTree>
+    <p:extLst>
+      <p:ext uri="{BB962C8B-B14F-4D97-AF65-F5344CB8AC3E}">
+        <p14:creationId xmlns:p14="http://schemas.microsoft.com/office/powerpoint/2010/main" val="2269659863"/>
+      </p:ext>
+    </p:extLst>
   </p:cSld>
   <p:clrMapOvr>
     <a:masterClrMapping/>

</xml_diff>

<commit_message>
modifying chatrrom diagram and powerpoint
</commit_message>
<xml_diff>
--- a/Design/Comms Project Design.pptx
+++ b/Design/Comms Project Design.pptx
@@ -5,7 +5,7 @@
     <p:sldMasterId id="2147483659" r:id="rId1"/>
   </p:sldMasterIdLst>
   <p:notesMasterIdLst>
-    <p:notesMasterId r:id="rId13"/>
+    <p:notesMasterId r:id="rId14"/>
   </p:notesMasterIdLst>
   <p:sldIdLst>
     <p:sldId id="256" r:id="rId2"/>
@@ -14,28 +14,29 @@
     <p:sldId id="261" r:id="rId5"/>
     <p:sldId id="265" r:id="rId6"/>
     <p:sldId id="263" r:id="rId7"/>
-    <p:sldId id="266" r:id="rId8"/>
-    <p:sldId id="268" r:id="rId9"/>
+    <p:sldId id="268" r:id="rId8"/>
+    <p:sldId id="266" r:id="rId9"/>
     <p:sldId id="267" r:id="rId10"/>
-    <p:sldId id="270" r:id="rId11"/>
-    <p:sldId id="269" r:id="rId12"/>
+    <p:sldId id="271" r:id="rId11"/>
+    <p:sldId id="270" r:id="rId12"/>
+    <p:sldId id="269" r:id="rId13"/>
   </p:sldIdLst>
   <p:sldSz cx="9144000" cy="5143500" type="screen16x9"/>
   <p:notesSz cx="6858000" cy="9144000"/>
   <p:embeddedFontLst>
     <p:embeddedFont>
       <p:font typeface="Lato" panose="020F0502020204030203" pitchFamily="34" charset="0"/>
-      <p:regular r:id="rId14"/>
-      <p:bold r:id="rId15"/>
-      <p:italic r:id="rId16"/>
-      <p:boldItalic r:id="rId17"/>
+      <p:regular r:id="rId15"/>
+      <p:bold r:id="rId16"/>
+      <p:italic r:id="rId17"/>
+      <p:boldItalic r:id="rId18"/>
     </p:embeddedFont>
     <p:embeddedFont>
       <p:font typeface="Montserrat" pitchFamily="2" charset="77"/>
-      <p:regular r:id="rId18"/>
-      <p:bold r:id="rId19"/>
-      <p:italic r:id="rId20"/>
-      <p:boldItalic r:id="rId21"/>
+      <p:regular r:id="rId19"/>
+      <p:bold r:id="rId20"/>
+      <p:italic r:id="rId21"/>
+      <p:boldItalic r:id="rId22"/>
     </p:embeddedFont>
   </p:embeddedFontLst>
   <p:defaultTextStyle>
@@ -1683,7 +1684,7 @@
     </p:spTree>
     <p:extLst>
       <p:ext uri="{BB962C8B-B14F-4D97-AF65-F5344CB8AC3E}">
-        <p14:creationId xmlns:p14="http://schemas.microsoft.com/office/powerpoint/2010/main" val="549123541"/>
+        <p14:creationId xmlns:p14="http://schemas.microsoft.com/office/powerpoint/2010/main" val="3808936698"/>
       </p:ext>
     </p:extLst>
   </p:cSld>
@@ -1792,7 +1793,7 @@
     </p:spTree>
     <p:extLst>
       <p:ext uri="{BB962C8B-B14F-4D97-AF65-F5344CB8AC3E}">
-        <p14:creationId xmlns:p14="http://schemas.microsoft.com/office/powerpoint/2010/main" val="3808936698"/>
+        <p14:creationId xmlns:p14="http://schemas.microsoft.com/office/powerpoint/2010/main" val="549123541"/>
       </p:ext>
     </p:extLst>
   </p:cSld>
@@ -10130,6 +10131,92 @@
   <p:cSld>
     <p:spTree>
       <p:nvGrpSpPr>
+        <p:cNvPr id="1" name=""/>
+        <p:cNvGrpSpPr/>
+        <p:nvPr/>
+      </p:nvGrpSpPr>
+      <p:grpSpPr>
+        <a:xfrm>
+          <a:off x="0" y="0"/>
+          <a:ext cx="0" cy="0"/>
+          <a:chOff x="0" y="0"/>
+          <a:chExt cx="0" cy="0"/>
+        </a:xfrm>
+      </p:grpSpPr>
+      <p:sp>
+        <p:nvSpPr>
+          <p:cNvPr id="2" name="Title 1">
+            <a:extLst>
+              <a:ext uri="{FF2B5EF4-FFF2-40B4-BE49-F238E27FC236}">
+                <a16:creationId xmlns:a16="http://schemas.microsoft.com/office/drawing/2014/main" id="{F82ED1DB-713E-D987-191D-1D4A93BB2877}"/>
+              </a:ext>
+            </a:extLst>
+          </p:cNvPr>
+          <p:cNvSpPr>
+            <a:spLocks noGrp="1"/>
+          </p:cNvSpPr>
+          <p:nvPr>
+            <p:ph type="title"/>
+          </p:nvPr>
+        </p:nvSpPr>
+        <p:spPr/>
+        <p:txBody>
+          <a:bodyPr/>
+          <a:lstStyle/>
+          <a:p>
+            <a:r>
+              <a:rPr lang="en-US" dirty="0"/>
+              <a:t>Logging file format</a:t>
+            </a:r>
+          </a:p>
+        </p:txBody>
+      </p:sp>
+      <p:sp>
+        <p:nvSpPr>
+          <p:cNvPr id="3" name="Text Placeholder 2">
+            <a:extLst>
+              <a:ext uri="{FF2B5EF4-FFF2-40B4-BE49-F238E27FC236}">
+                <a16:creationId xmlns:a16="http://schemas.microsoft.com/office/drawing/2014/main" id="{5C343418-B7D2-A795-624D-47FAA7C5F6C9}"/>
+              </a:ext>
+            </a:extLst>
+          </p:cNvPr>
+          <p:cNvSpPr>
+            <a:spLocks noGrp="1"/>
+          </p:cNvSpPr>
+          <p:nvPr>
+            <p:ph type="body" idx="1"/>
+          </p:nvPr>
+        </p:nvSpPr>
+        <p:spPr/>
+        <p:txBody>
+          <a:bodyPr/>
+          <a:lstStyle/>
+          <a:p>
+            <a:r>
+              <a:rPr lang="en-US"/>
+              <a:t>Add image here</a:t>
+            </a:r>
+          </a:p>
+        </p:txBody>
+      </p:sp>
+    </p:spTree>
+    <p:extLst>
+      <p:ext uri="{BB962C8B-B14F-4D97-AF65-F5344CB8AC3E}">
+        <p14:creationId xmlns:p14="http://schemas.microsoft.com/office/powerpoint/2010/main" val="3111268271"/>
+      </p:ext>
+    </p:extLst>
+  </p:cSld>
+  <p:clrMapOvr>
+    <a:masterClrMapping/>
+  </p:clrMapOvr>
+</p:sld>
+</file>
+
+<file path=ppt/slides/slide11.xml><?xml version="1.0" encoding="utf-8"?>
+<p:sld xmlns:a="http://schemas.openxmlformats.org/drawingml/2006/main" xmlns:r="http://schemas.openxmlformats.org/officeDocument/2006/relationships" xmlns:p="http://schemas.openxmlformats.org/presentationml/2006/main">
+  <p:cSld>
+    <p:spTree>
+      <p:nvGrpSpPr>
         <p:cNvPr id="1" name="Shape 162"/>
         <p:cNvGrpSpPr/>
         <p:nvPr/>
@@ -10203,7 +10290,7 @@
 </p:sld>
 </file>
 
-<file path=ppt/slides/slide11.xml><?xml version="1.0" encoding="utf-8"?>
+<file path=ppt/slides/slide12.xml><?xml version="1.0" encoding="utf-8"?>
 <p:sld xmlns:a="http://schemas.openxmlformats.org/drawingml/2006/main" xmlns:r="http://schemas.openxmlformats.org/officeDocument/2006/relationships" xmlns:p="http://schemas.openxmlformats.org/presentationml/2006/main">
   <p:cSld>
     <p:spTree>
@@ -11026,10 +11113,10 @@
       </p:sp>
       <p:pic>
         <p:nvPicPr>
-          <p:cNvPr id="4" name="Picture 3" descr="A diagram of a tunnel&#10;&#10;Description automatically generated">
+          <p:cNvPr id="5" name="Picture 4" descr="A diagram of a tunnel&#10;&#10;Description automatically generated">
             <a:extLst>
               <a:ext uri="{FF2B5EF4-FFF2-40B4-BE49-F238E27FC236}">
-                <a16:creationId xmlns:a16="http://schemas.microsoft.com/office/drawing/2014/main" id="{C8B13831-C45D-68F9-C0A1-7A7DEA982B71}"/>
+                <a16:creationId xmlns:a16="http://schemas.microsoft.com/office/drawing/2014/main" id="{CC7FEF62-25A6-BEFA-FB2C-335E78A26619}"/>
               </a:ext>
             </a:extLst>
           </p:cNvPr>
@@ -11046,8 +11133,8 @@
         </p:blipFill>
         <p:spPr>
           <a:xfrm>
-            <a:off x="685800" y="1179376"/>
-            <a:ext cx="7772400" cy="3662434"/>
+            <a:off x="748430" y="1045718"/>
+            <a:ext cx="8163719" cy="3841750"/>
           </a:xfrm>
           <a:prstGeom prst="rect">
             <a:avLst/>
@@ -11057,7 +11144,7 @@
     </p:spTree>
     <p:extLst>
       <p:ext uri="{BB962C8B-B14F-4D97-AF65-F5344CB8AC3E}">
-        <p14:creationId xmlns:p14="http://schemas.microsoft.com/office/powerpoint/2010/main" val="3215031570"/>
+        <p14:creationId xmlns:p14="http://schemas.microsoft.com/office/powerpoint/2010/main" val="3087820841"/>
       </p:ext>
     </p:extLst>
   </p:cSld>
@@ -11134,10 +11221,10 @@
       </p:sp>
       <p:pic>
         <p:nvPicPr>
-          <p:cNvPr id="4" name="Picture 3" descr="A diagram of a server handling system&#10;&#10;Description automatically generated">
+          <p:cNvPr id="5" name="Picture 4" descr="A diagram of a server handling&#10;&#10;Description automatically generated">
             <a:extLst>
               <a:ext uri="{FF2B5EF4-FFF2-40B4-BE49-F238E27FC236}">
-                <a16:creationId xmlns:a16="http://schemas.microsoft.com/office/drawing/2014/main" id="{536053F3-2E7E-4C84-342A-FE2721C4CD72}"/>
+                <a16:creationId xmlns:a16="http://schemas.microsoft.com/office/drawing/2014/main" id="{7F9F4324-9D50-7B3E-9830-E967254076F5}"/>
               </a:ext>
             </a:extLst>
           </p:cNvPr>
@@ -11154,8 +11241,8 @@
         </p:blipFill>
         <p:spPr>
           <a:xfrm>
-            <a:off x="1117600" y="1117267"/>
-            <a:ext cx="7772400" cy="3613565"/>
+            <a:off x="858050" y="1122504"/>
+            <a:ext cx="7771079" cy="3287116"/>
           </a:xfrm>
           <a:prstGeom prst="rect">
             <a:avLst/>
@@ -11165,7 +11252,7 @@
     </p:spTree>
     <p:extLst>
       <p:ext uri="{BB962C8B-B14F-4D97-AF65-F5344CB8AC3E}">
-        <p14:creationId xmlns:p14="http://schemas.microsoft.com/office/powerpoint/2010/main" val="3087820841"/>
+        <p14:creationId xmlns:p14="http://schemas.microsoft.com/office/powerpoint/2010/main" val="3215031570"/>
       </p:ext>
     </p:extLst>
   </p:cSld>
@@ -11242,10 +11329,10 @@
       </p:sp>
       <p:pic>
         <p:nvPicPr>
-          <p:cNvPr id="4" name="Picture 3" descr="A diagram of a chat bot&#10;&#10;Description automatically generated">
+          <p:cNvPr id="7" name="Picture 6" descr="A diagram of a chatbot&#10;&#10;Description automatically generated">
             <a:extLst>
               <a:ext uri="{FF2B5EF4-FFF2-40B4-BE49-F238E27FC236}">
-                <a16:creationId xmlns:a16="http://schemas.microsoft.com/office/drawing/2014/main" id="{136600DE-279E-DBC5-B895-E1681DB04CB5}"/>
+                <a16:creationId xmlns:a16="http://schemas.microsoft.com/office/drawing/2014/main" id="{D888E80B-E0B9-D50C-5F17-6EA29F4EEC87}"/>
               </a:ext>
             </a:extLst>
           </p:cNvPr>
@@ -11262,8 +11349,8 @@
         </p:blipFill>
         <p:spPr>
           <a:xfrm>
-            <a:off x="1939771" y="1035039"/>
-            <a:ext cx="5465680" cy="3755245"/>
+            <a:off x="1575207" y="1122504"/>
+            <a:ext cx="6382586" cy="3695700"/>
           </a:xfrm>
           <a:prstGeom prst="rect">
             <a:avLst/>

</xml_diff>

<commit_message>
final design phase additions
</commit_message>
<xml_diff>
--- a/Design/Comms Project Design.pptx
+++ b/Design/Comms Project Design.pptx
@@ -10283,10 +10283,10 @@
       </p:sp>
       <p:pic>
         <p:nvPicPr>
-          <p:cNvPr id="9" name="Picture 8" descr="A white paper with black text&#10;&#10;Description automatically generated">
+          <p:cNvPr id="4" name="Picture 3" descr="A paper with a few papers&#10;&#10;Description automatically generated with medium confidence">
             <a:extLst>
               <a:ext uri="{FF2B5EF4-FFF2-40B4-BE49-F238E27FC236}">
-                <a16:creationId xmlns:a16="http://schemas.microsoft.com/office/drawing/2014/main" id="{EF3F578A-125E-E074-15D5-70FDE93BF966}"/>
+                <a16:creationId xmlns:a16="http://schemas.microsoft.com/office/drawing/2014/main" id="{546BAB63-AB81-F61E-D404-0E63F4BA644B}"/>
               </a:ext>
             </a:extLst>
           </p:cNvPr>
@@ -10303,8 +10303,8 @@
         </p:blipFill>
         <p:spPr>
           <a:xfrm>
-            <a:off x="2791269" y="1307850"/>
-            <a:ext cx="3561461" cy="3734013"/>
+            <a:off x="2797322" y="1060681"/>
+            <a:ext cx="3894149" cy="4082819"/>
           </a:xfrm>
           <a:prstGeom prst="rect">
             <a:avLst/>
@@ -11494,10 +11494,10 @@
       </p:sp>
       <p:pic>
         <p:nvPicPr>
-          <p:cNvPr id="7" name="Picture 6" descr="A diagram of a chatbot&#10;&#10;Description automatically generated">
+          <p:cNvPr id="4" name="Picture 3" descr="A diagram of a chatbot&#10;&#10;Description automatically generated">
             <a:extLst>
               <a:ext uri="{FF2B5EF4-FFF2-40B4-BE49-F238E27FC236}">
-                <a16:creationId xmlns:a16="http://schemas.microsoft.com/office/drawing/2014/main" id="{D888E80B-E0B9-D50C-5F17-6EA29F4EEC87}"/>
+                <a16:creationId xmlns:a16="http://schemas.microsoft.com/office/drawing/2014/main" id="{56D06F22-B0A5-C9DD-38CE-34186189073D}"/>
               </a:ext>
             </a:extLst>
           </p:cNvPr>
@@ -11514,8 +11514,8 @@
         </p:blipFill>
         <p:spPr>
           <a:xfrm>
-            <a:off x="1575207" y="1122504"/>
-            <a:ext cx="6382586" cy="3695700"/>
+            <a:off x="1979974" y="1176914"/>
+            <a:ext cx="5286781" cy="3966586"/>
           </a:xfrm>
           <a:prstGeom prst="rect">
             <a:avLst/>

</xml_diff>